<commit_message>
More work on arch and ios.
</commit_message>
<xml_diff>
--- a/Architecture.pptx
+++ b/Architecture.pptx
@@ -136,7 +136,7 @@
         </p:nvSpPr>
         <p:spPr>
           <a:xfrm>
-            <a:off x="685800" y="2130425"/>
+            <a:off x="685800" y="2130429"/>
             <a:ext cx="7772400" cy="1470025"/>
           </a:xfrm>
         </p:spPr>
@@ -288,7 +288,7 @@
           <a:p>
             <a:fld id="{4EB55246-26D4-B843-A31D-0832833747D9}" type="datetimeFigureOut">
               <a:rPr lang="en-US" smtClean="0"/>
-              <a:t>4/2/15</a:t>
+              <a:t>4/6/15</a:t>
             </a:fld>
             <a:endParaRPr lang="en-US"/>
           </a:p>
@@ -458,7 +458,7 @@
           <a:p>
             <a:fld id="{4EB55246-26D4-B843-A31D-0832833747D9}" type="datetimeFigureOut">
               <a:rPr lang="en-US" smtClean="0"/>
-              <a:t>4/2/15</a:t>
+              <a:t>4/6/15</a:t>
             </a:fld>
             <a:endParaRPr lang="en-US"/>
           </a:p>
@@ -548,7 +548,7 @@
         </p:nvSpPr>
         <p:spPr>
           <a:xfrm>
-            <a:off x="6629400" y="274638"/>
+            <a:off x="6629400" y="274642"/>
             <a:ext cx="2057400" cy="5851525"/>
           </a:xfrm>
         </p:spPr>
@@ -576,7 +576,7 @@
         </p:nvSpPr>
         <p:spPr>
           <a:xfrm>
-            <a:off x="457200" y="274638"/>
+            <a:off x="457200" y="274642"/>
             <a:ext cx="6019800" cy="5851525"/>
           </a:xfrm>
         </p:spPr>
@@ -638,7 +638,7 @@
           <a:p>
             <a:fld id="{4EB55246-26D4-B843-A31D-0832833747D9}" type="datetimeFigureOut">
               <a:rPr lang="en-US" smtClean="0"/>
-              <a:t>4/2/15</a:t>
+              <a:t>4/6/15</a:t>
             </a:fld>
             <a:endParaRPr lang="en-US"/>
           </a:p>
@@ -808,7 +808,7 @@
           <a:p>
             <a:fld id="{4EB55246-26D4-B843-A31D-0832833747D9}" type="datetimeFigureOut">
               <a:rPr lang="en-US" smtClean="0"/>
-              <a:t>4/2/15</a:t>
+              <a:t>4/6/15</a:t>
             </a:fld>
             <a:endParaRPr lang="en-US"/>
           </a:p>
@@ -898,7 +898,7 @@
         </p:nvSpPr>
         <p:spPr>
           <a:xfrm>
-            <a:off x="722313" y="4406900"/>
+            <a:off x="722313" y="4406904"/>
             <a:ext cx="7772400" cy="1362075"/>
           </a:xfrm>
         </p:spPr>
@@ -1054,7 +1054,7 @@
           <a:p>
             <a:fld id="{4EB55246-26D4-B843-A31D-0832833747D9}" type="datetimeFigureOut">
               <a:rPr lang="en-US" smtClean="0"/>
-              <a:t>4/2/15</a:t>
+              <a:t>4/6/15</a:t>
             </a:fld>
             <a:endParaRPr lang="en-US"/>
           </a:p>
@@ -1167,7 +1167,7 @@
         </p:nvSpPr>
         <p:spPr>
           <a:xfrm>
-            <a:off x="457200" y="1600200"/>
+            <a:off x="457200" y="1600204"/>
             <a:ext cx="4038600" cy="4525963"/>
           </a:xfrm>
         </p:spPr>
@@ -1252,7 +1252,7 @@
         </p:nvSpPr>
         <p:spPr>
           <a:xfrm>
-            <a:off x="4648200" y="1600200"/>
+            <a:off x="4648200" y="1600204"/>
             <a:ext cx="4038600" cy="4525963"/>
           </a:xfrm>
         </p:spPr>
@@ -1342,7 +1342,7 @@
           <a:p>
             <a:fld id="{4EB55246-26D4-B843-A31D-0832833747D9}" type="datetimeFigureOut">
               <a:rPr lang="en-US" smtClean="0"/>
-              <a:t>4/2/15</a:t>
+              <a:t>4/6/15</a:t>
             </a:fld>
             <a:endParaRPr lang="en-US"/>
           </a:p>
@@ -1609,7 +1609,7 @@
         </p:nvSpPr>
         <p:spPr>
           <a:xfrm>
-            <a:off x="4645025" y="1535113"/>
+            <a:off x="4645029" y="1535113"/>
             <a:ext cx="4041775" cy="639762"/>
           </a:xfrm>
         </p:spPr>
@@ -1674,7 +1674,7 @@
         </p:nvSpPr>
         <p:spPr>
           <a:xfrm>
-            <a:off x="4645025" y="2174875"/>
+            <a:off x="4645029" y="2174875"/>
             <a:ext cx="4041775" cy="3951288"/>
           </a:xfrm>
         </p:spPr>
@@ -1764,7 +1764,7 @@
           <a:p>
             <a:fld id="{4EB55246-26D4-B843-A31D-0832833747D9}" type="datetimeFigureOut">
               <a:rPr lang="en-US" smtClean="0"/>
-              <a:t>4/2/15</a:t>
+              <a:t>4/6/15</a:t>
             </a:fld>
             <a:endParaRPr lang="en-US"/>
           </a:p>
@@ -1882,7 +1882,7 @@
           <a:p>
             <a:fld id="{4EB55246-26D4-B843-A31D-0832833747D9}" type="datetimeFigureOut">
               <a:rPr lang="en-US" smtClean="0"/>
-              <a:t>4/2/15</a:t>
+              <a:t>4/6/15</a:t>
             </a:fld>
             <a:endParaRPr lang="en-US"/>
           </a:p>
@@ -1977,7 +1977,7 @@
           <a:p>
             <a:fld id="{4EB55246-26D4-B843-A31D-0832833747D9}" type="datetimeFigureOut">
               <a:rPr lang="en-US" smtClean="0"/>
-              <a:t>4/2/15</a:t>
+              <a:t>4/6/15</a:t>
             </a:fld>
             <a:endParaRPr lang="en-US"/>
           </a:p>
@@ -2067,7 +2067,7 @@
         </p:nvSpPr>
         <p:spPr>
           <a:xfrm>
-            <a:off x="457200" y="273050"/>
+            <a:off x="457204" y="273050"/>
             <a:ext cx="3008313" cy="1162050"/>
           </a:xfrm>
         </p:spPr>
@@ -2099,7 +2099,7 @@
         </p:nvSpPr>
         <p:spPr>
           <a:xfrm>
-            <a:off x="3575050" y="273050"/>
+            <a:off x="3575050" y="273054"/>
             <a:ext cx="5111750" cy="5853113"/>
           </a:xfrm>
         </p:spPr>
@@ -2184,7 +2184,7 @@
         </p:nvSpPr>
         <p:spPr>
           <a:xfrm>
-            <a:off x="457200" y="1435100"/>
+            <a:off x="457204" y="1435103"/>
             <a:ext cx="3008313" cy="4691063"/>
           </a:xfrm>
         </p:spPr>
@@ -2254,7 +2254,7 @@
           <a:p>
             <a:fld id="{4EB55246-26D4-B843-A31D-0832833747D9}" type="datetimeFigureOut">
               <a:rPr lang="en-US" smtClean="0"/>
-              <a:t>4/2/15</a:t>
+              <a:t>4/6/15</a:t>
             </a:fld>
             <a:endParaRPr lang="en-US"/>
           </a:p>
@@ -2507,7 +2507,7 @@
           <a:p>
             <a:fld id="{4EB55246-26D4-B843-A31D-0832833747D9}" type="datetimeFigureOut">
               <a:rPr lang="en-US" smtClean="0"/>
-              <a:t>4/2/15</a:t>
+              <a:t>4/6/15</a:t>
             </a:fld>
             <a:endParaRPr lang="en-US"/>
           </a:p>
@@ -2635,7 +2635,7 @@
         </p:nvSpPr>
         <p:spPr>
           <a:xfrm>
-            <a:off x="457200" y="1600200"/>
+            <a:off x="457200" y="1600204"/>
             <a:ext cx="8229600" cy="4525963"/>
           </a:xfrm>
           <a:prstGeom prst="rect">
@@ -2697,7 +2697,7 @@
         </p:nvSpPr>
         <p:spPr>
           <a:xfrm>
-            <a:off x="457200" y="6356350"/>
+            <a:off x="457200" y="6356354"/>
             <a:ext cx="2133600" cy="365125"/>
           </a:xfrm>
           <a:prstGeom prst="rect">
@@ -2720,7 +2720,7 @@
           <a:p>
             <a:fld id="{4EB55246-26D4-B843-A31D-0832833747D9}" type="datetimeFigureOut">
               <a:rPr lang="en-US" smtClean="0"/>
-              <a:t>4/2/15</a:t>
+              <a:t>4/6/15</a:t>
             </a:fld>
             <a:endParaRPr lang="en-US"/>
           </a:p>
@@ -2738,7 +2738,7 @@
         </p:nvSpPr>
         <p:spPr>
           <a:xfrm>
-            <a:off x="3124200" y="6356350"/>
+            <a:off x="3124200" y="6356354"/>
             <a:ext cx="2895600" cy="365125"/>
           </a:xfrm>
           <a:prstGeom prst="rect">
@@ -2775,7 +2775,7 @@
         </p:nvSpPr>
         <p:spPr>
           <a:xfrm>
-            <a:off x="6553200" y="6356350"/>
+            <a:off x="6553200" y="6356354"/>
             <a:ext cx="2133600" cy="365125"/>
           </a:xfrm>
           <a:prstGeom prst="rect">
@@ -3103,7 +3103,7 @@
         </p:nvSpPr>
         <p:spPr>
           <a:xfrm>
-            <a:off x="5218428" y="738766"/>
+            <a:off x="5218428" y="738769"/>
             <a:ext cx="3073068" cy="1378459"/>
           </a:xfrm>
           <a:prstGeom prst="cloud">
@@ -3125,7 +3125,7 @@
           </a:fontRef>
         </p:style>
         <p:txBody>
-          <a:bodyPr rtlCol="0" anchor="ctr"/>
+          <a:bodyPr lIns="91440" tIns="45720" rIns="91440" bIns="45720" rtlCol="0" anchor="ctr"/>
           <a:lstStyle/>
           <a:p>
             <a:pPr algn="ctr"/>
@@ -3143,7 +3143,7 @@
                   <a:srgbClr val="000000"/>
                 </a:solidFill>
               </a:rPr>
-              <a:t>Remote Data Store</a:t>
+              <a:t>Cloud Services</a:t>
             </a:r>
           </a:p>
           <a:p>
@@ -3188,7 +3188,7 @@
         </p:nvSpPr>
         <p:spPr>
           <a:xfrm>
-            <a:off x="198601" y="81094"/>
+            <a:off x="0" y="0"/>
             <a:ext cx="2792774" cy="4387036"/>
           </a:xfrm>
           <a:prstGeom prst="roundRect">
@@ -3211,7 +3211,7 @@
           </a:fontRef>
         </p:style>
         <p:txBody>
-          <a:bodyPr/>
+          <a:bodyPr lIns="91440" tIns="45720" rIns="91440" bIns="45720"/>
           <a:lstStyle/>
           <a:p>
             <a:pPr algn="ctr"/>
@@ -3261,7 +3261,7 @@
           </a:fontRef>
         </p:style>
         <p:txBody>
-          <a:bodyPr rtlCol="0" anchor="ctr"/>
+          <a:bodyPr lIns="91440" tIns="45720" rIns="91440" bIns="45720" rtlCol="0" anchor="ctr"/>
           <a:lstStyle/>
           <a:p>
             <a:pPr algn="ctr"/>
@@ -3317,8 +3317,8 @@
         </p:nvSpPr>
         <p:spPr>
           <a:xfrm>
-            <a:off x="2562738" y="3805848"/>
-            <a:ext cx="2272548" cy="2178678"/>
+            <a:off x="2221526" y="4838868"/>
+            <a:ext cx="2272548" cy="1908955"/>
           </a:xfrm>
           <a:prstGeom prst="roundRect">
             <a:avLst/>
@@ -3339,16 +3339,8 @@
           </a:fontRef>
         </p:style>
         <p:txBody>
-          <a:bodyPr rtlCol="0" anchor="ctr"/>
-          <a:lstStyle/>
-          <a:p>
-            <a:pPr algn="ctr"/>
-            <a:endParaRPr lang="en-US" dirty="0" smtClean="0">
-              <a:solidFill>
-                <a:srgbClr val="000000"/>
-              </a:solidFill>
-            </a:endParaRPr>
-          </a:p>
+          <a:bodyPr lIns="91440" tIns="45720" rIns="91440" bIns="45720" rtlCol="0" anchor="ctr"/>
+          <a:lstStyle/>
           <a:p>
             <a:pPr algn="ctr"/>
             <a:r>
@@ -3357,7 +3349,7 @@
                   <a:srgbClr val="000000"/>
                 </a:solidFill>
               </a:rPr>
-              <a:t>Probe</a:t>
+              <a:t>Probes</a:t>
             </a:r>
           </a:p>
           <a:p>
@@ -3430,31 +3422,165 @@
               <a:t>…</a:t>
             </a:r>
           </a:p>
-          <a:p>
-            <a:pPr marL="285750" indent="-169863">
-              <a:buFont typeface="Arial"/>
-              <a:buChar char="•"/>
-            </a:pPr>
-            <a:endParaRPr lang="en-US" dirty="0">
-              <a:solidFill>
-                <a:srgbClr val="000000"/>
-              </a:solidFill>
-            </a:endParaRPr>
-          </a:p>
-        </p:txBody>
-      </p:sp>
-      <p:sp>
-        <p:nvSpPr>
-          <p:cNvPr id="13" name="Curved Right Arrow 12"/>
+        </p:txBody>
+      </p:sp>
+      <p:grpSp>
+        <p:nvGrpSpPr>
+          <p:cNvPr id="2" name="Group 1"/>
+          <p:cNvGrpSpPr/>
+          <p:nvPr/>
+        </p:nvGrpSpPr>
+        <p:grpSpPr>
+          <a:xfrm>
+            <a:off x="4990878" y="4217364"/>
+            <a:ext cx="1804731" cy="1210024"/>
+            <a:chOff x="4990878" y="4217364"/>
+            <a:chExt cx="1804731" cy="1210024"/>
+          </a:xfrm>
+        </p:grpSpPr>
+        <p:sp>
+          <p:nvSpPr>
+            <p:cNvPr id="13" name="Curved Right Arrow 12"/>
+            <p:cNvSpPr/>
+            <p:nvPr/>
+          </p:nvSpPr>
+          <p:spPr>
+            <a:xfrm>
+              <a:off x="4990878" y="4550069"/>
+              <a:ext cx="1804731" cy="622761"/>
+            </a:xfrm>
+            <a:prstGeom prst="curvedRightArrow">
+              <a:avLst/>
+            </a:prstGeom>
+          </p:spPr>
+          <p:style>
+            <a:lnRef idx="1">
+              <a:schemeClr val="accent1"/>
+            </a:lnRef>
+            <a:fillRef idx="3">
+              <a:schemeClr val="accent1"/>
+            </a:fillRef>
+            <a:effectRef idx="2">
+              <a:schemeClr val="accent1"/>
+            </a:effectRef>
+            <a:fontRef idx="minor">
+              <a:schemeClr val="lt1"/>
+            </a:fontRef>
+          </p:style>
+          <p:txBody>
+            <a:bodyPr lIns="91440" tIns="45720" rIns="91440" bIns="45720" rtlCol="0" anchor="ctr"/>
+            <a:lstStyle/>
+            <a:p>
+              <a:pPr algn="ctr"/>
+              <a:endParaRPr lang="en-US" dirty="0">
+                <a:solidFill>
+                  <a:schemeClr val="tx1"/>
+                </a:solidFill>
+              </a:endParaRPr>
+            </a:p>
+          </p:txBody>
+        </p:sp>
+        <p:sp>
+          <p:nvSpPr>
+            <p:cNvPr id="15" name="TextBox 14"/>
+            <p:cNvSpPr txBox="1"/>
+            <p:nvPr/>
+          </p:nvSpPr>
+          <p:spPr>
+            <a:xfrm>
+              <a:off x="5284774" y="4217364"/>
+              <a:ext cx="1402948" cy="369332"/>
+            </a:xfrm>
+            <a:prstGeom prst="rect">
+              <a:avLst/>
+            </a:prstGeom>
+            <a:noFill/>
+          </p:spPr>
+          <p:txBody>
+            <a:bodyPr wrap="none" lIns="91440" tIns="45720" rIns="91440" bIns="45720" rtlCol="0">
+              <a:spAutoFit/>
+            </a:bodyPr>
+            <a:lstStyle/>
+            <a:p>
+              <a:r>
+                <a:rPr lang="en-US" dirty="0" smtClean="0"/>
+                <a:t>Data request</a:t>
+              </a:r>
+            </a:p>
+          </p:txBody>
+        </p:sp>
+        <p:sp>
+          <p:nvSpPr>
+            <p:cNvPr id="16" name="TextBox 15"/>
+            <p:cNvSpPr txBox="1"/>
+            <p:nvPr/>
+          </p:nvSpPr>
+          <p:spPr>
+            <a:xfrm>
+              <a:off x="5303730" y="5058056"/>
+              <a:ext cx="1335447" cy="369332"/>
+            </a:xfrm>
+            <a:prstGeom prst="rect">
+              <a:avLst/>
+            </a:prstGeom>
+            <a:noFill/>
+          </p:spPr>
+          <p:txBody>
+            <a:bodyPr wrap="none" lIns="91440" tIns="45720" rIns="91440" bIns="45720" rtlCol="0">
+              <a:spAutoFit/>
+            </a:bodyPr>
+            <a:lstStyle/>
+            <a:p>
+              <a:r>
+                <a:rPr lang="en-US" dirty="0" smtClean="0"/>
+                <a:t>Probed data</a:t>
+              </a:r>
+            </a:p>
+          </p:txBody>
+        </p:sp>
+      </p:grpSp>
+      <p:pic>
+        <p:nvPicPr>
+          <p:cNvPr id="3" name="Picture 2" descr="detection-clipart-9cRz4LKoi.png"/>
+          <p:cNvPicPr>
+            <a:picLocks noChangeAspect="1"/>
+          </p:cNvPicPr>
+          <p:nvPr/>
+        </p:nvPicPr>
+        <p:blipFill>
+          <a:blip r:embed="rId2">
+            <a:extLst>
+              <a:ext uri="{28A0092B-C50C-407E-A947-70E740481C1C}">
+                <a14:useLocalDpi xmlns:a14="http://schemas.microsoft.com/office/drawing/2010/main" val="0"/>
+              </a:ext>
+            </a:extLst>
+          </a:blip>
+          <a:stretch>
+            <a:fillRect/>
+          </a:stretch>
+        </p:blipFill>
+        <p:spPr>
+          <a:xfrm>
+            <a:off x="0" y="4729164"/>
+            <a:ext cx="1208441" cy="2128835"/>
+          </a:xfrm>
+          <a:prstGeom prst="rect">
+            <a:avLst/>
+          </a:prstGeom>
+        </p:spPr>
+      </p:pic>
+      <p:sp>
+        <p:nvSpPr>
+          <p:cNvPr id="11" name="Rounded Rectangle 10"/>
           <p:cNvSpPr/>
           <p:nvPr/>
         </p:nvSpPr>
         <p:spPr>
           <a:xfrm>
-            <a:off x="4990876" y="4550066"/>
-            <a:ext cx="1804731" cy="622761"/>
+            <a:off x="6847693" y="2475586"/>
+            <a:ext cx="2134448" cy="1134966"/>
           </a:xfrm>
-          <a:prstGeom prst="curvedRightArrow">
+          <a:prstGeom prst="roundRect">
             <a:avLst/>
           </a:prstGeom>
         </p:spPr>
@@ -3473,79 +3599,123 @@
           </a:fontRef>
         </p:style>
         <p:txBody>
-          <a:bodyPr rtlCol="0" anchor="ctr"/>
+          <a:bodyPr lIns="91440" tIns="45720" rIns="91440" bIns="45720" rtlCol="0" anchor="ctr"/>
           <a:lstStyle/>
           <a:p>
             <a:pPr algn="ctr"/>
+            <a:r>
+              <a:rPr lang="en-US" dirty="0" smtClean="0">
+                <a:solidFill>
+                  <a:srgbClr val="000000"/>
+                </a:solidFill>
+              </a:rPr>
+              <a:t>Remote Data Store</a:t>
+            </a:r>
+          </a:p>
+          <a:p>
+            <a:pPr marL="285750" indent="-169863">
+              <a:buFont typeface="Arial"/>
+              <a:buChar char="•"/>
+            </a:pPr>
+            <a:r>
+              <a:rPr lang="en-US" dirty="0" smtClean="0">
+                <a:solidFill>
+                  <a:srgbClr val="000000"/>
+                </a:solidFill>
+              </a:rPr>
+              <a:t>File </a:t>
+            </a:r>
+          </a:p>
+          <a:p>
+            <a:pPr marL="285750" indent="-169863">
+              <a:buFont typeface="Arial"/>
+              <a:buChar char="•"/>
+            </a:pPr>
+            <a:r>
+              <a:rPr lang="en-US" dirty="0" smtClean="0">
+                <a:solidFill>
+                  <a:srgbClr val="000000"/>
+                </a:solidFill>
+              </a:rPr>
+              <a:t>RAM</a:t>
+            </a:r>
             <a:endParaRPr lang="en-US" dirty="0">
               <a:solidFill>
-                <a:schemeClr val="tx1"/>
+                <a:srgbClr val="000000"/>
               </a:solidFill>
             </a:endParaRPr>
           </a:p>
         </p:txBody>
       </p:sp>
-      <p:sp>
-        <p:nvSpPr>
-          <p:cNvPr id="15" name="TextBox 14"/>
-          <p:cNvSpPr txBox="1"/>
+      <p:cxnSp>
+        <p:nvCxnSpPr>
+          <p:cNvPr id="46" name="Straight Connector 45"/>
+          <p:cNvCxnSpPr>
+            <a:stCxn id="3" idx="3"/>
+            <a:endCxn id="12" idx="1"/>
+          </p:cNvCxnSpPr>
           <p:nvPr/>
-        </p:nvSpPr>
+        </p:nvCxnSpPr>
         <p:spPr>
-          <a:xfrm>
-            <a:off x="4927275" y="4217364"/>
-            <a:ext cx="1986692" cy="369332"/>
+          <a:xfrm flipV="1">
+            <a:off x="1208441" y="5793346"/>
+            <a:ext cx="1013085" cy="236"/>
           </a:xfrm>
-          <a:prstGeom prst="rect">
+          <a:prstGeom prst="line">
             <a:avLst/>
           </a:prstGeom>
-          <a:noFill/>
+          <a:ln>
+            <a:tailEnd type="triangle" w="lg"/>
+          </a:ln>
         </p:spPr>
-        <p:txBody>
-          <a:bodyPr wrap="none" rtlCol="0">
-            <a:spAutoFit/>
-          </a:bodyPr>
-          <a:lstStyle/>
-          <a:p>
-            <a:r>
-              <a:rPr lang="en-US" dirty="0" smtClean="0"/>
-              <a:t>Probe data request</a:t>
-            </a:r>
-          </a:p>
-        </p:txBody>
-      </p:sp>
-      <p:sp>
-        <p:nvSpPr>
-          <p:cNvPr id="16" name="TextBox 15"/>
-          <p:cNvSpPr txBox="1"/>
+        <p:style>
+          <a:lnRef idx="2">
+            <a:schemeClr val="accent1"/>
+          </a:lnRef>
+          <a:fillRef idx="0">
+            <a:schemeClr val="accent1"/>
+          </a:fillRef>
+          <a:effectRef idx="1">
+            <a:schemeClr val="accent1"/>
+          </a:effectRef>
+          <a:fontRef idx="minor">
+            <a:schemeClr val="tx1"/>
+          </a:fontRef>
+        </p:style>
+      </p:cxnSp>
+      <p:cxnSp>
+        <p:nvCxnSpPr>
+          <p:cNvPr id="47" name="Straight Connector 46"/>
+          <p:cNvCxnSpPr/>
           <p:nvPr/>
-        </p:nvSpPr>
+        </p:nvCxnSpPr>
         <p:spPr>
-          <a:xfrm>
-            <a:off x="4990877" y="5058056"/>
-            <a:ext cx="1862033" cy="646331"/>
+          <a:xfrm flipV="1">
+            <a:off x="1208441" y="5427388"/>
+            <a:ext cx="1013085" cy="236"/>
           </a:xfrm>
-          <a:prstGeom prst="rect">
+          <a:prstGeom prst="line">
             <a:avLst/>
           </a:prstGeom>
-          <a:noFill/>
+          <a:ln>
+            <a:tailEnd type="triangle" w="lg"/>
+          </a:ln>
         </p:spPr>
-        <p:txBody>
-          <a:bodyPr wrap="none" rtlCol="0">
-            <a:spAutoFit/>
-          </a:bodyPr>
-          <a:lstStyle/>
-          <a:p>
-            <a:r>
-              <a:rPr lang="en-US" dirty="0" smtClean="0"/>
-              <a:t>Probe data return</a:t>
-            </a:r>
-          </a:p>
-          <a:p>
-            <a:endParaRPr lang="en-US" dirty="0" smtClean="0"/>
-          </a:p>
-        </p:txBody>
-      </p:sp>
+        <p:style>
+          <a:lnRef idx="2">
+            <a:schemeClr val="accent1"/>
+          </a:lnRef>
+          <a:fillRef idx="0">
+            <a:schemeClr val="accent1"/>
+          </a:fillRef>
+          <a:effectRef idx="1">
+            <a:schemeClr val="accent1"/>
+          </a:effectRef>
+          <a:fontRef idx="minor">
+            <a:schemeClr val="tx1"/>
+          </a:fontRef>
+        </p:style>
+      </p:cxnSp>
     </p:spTree>
     <p:extLst>
       <p:ext uri="{BB962C8B-B14F-4D97-AF65-F5344CB8AC3E}">

</xml_diff>

<commit_message>
Ready to debug initial callback model.
</commit_message>
<xml_diff>
--- a/Architecture.pptx
+++ b/Architecture.pptx
@@ -288,7 +288,7 @@
           <a:p>
             <a:fld id="{4EB55246-26D4-B843-A31D-0832833747D9}" type="datetimeFigureOut">
               <a:rPr lang="en-US" smtClean="0"/>
-              <a:t>4/6/15</a:t>
+              <a:t>4/8/15</a:t>
             </a:fld>
             <a:endParaRPr lang="en-US"/>
           </a:p>
@@ -458,7 +458,7 @@
           <a:p>
             <a:fld id="{4EB55246-26D4-B843-A31D-0832833747D9}" type="datetimeFigureOut">
               <a:rPr lang="en-US" smtClean="0"/>
-              <a:t>4/6/15</a:t>
+              <a:t>4/8/15</a:t>
             </a:fld>
             <a:endParaRPr lang="en-US"/>
           </a:p>
@@ -638,7 +638,7 @@
           <a:p>
             <a:fld id="{4EB55246-26D4-B843-A31D-0832833747D9}" type="datetimeFigureOut">
               <a:rPr lang="en-US" smtClean="0"/>
-              <a:t>4/6/15</a:t>
+              <a:t>4/8/15</a:t>
             </a:fld>
             <a:endParaRPr lang="en-US"/>
           </a:p>
@@ -808,7 +808,7 @@
           <a:p>
             <a:fld id="{4EB55246-26D4-B843-A31D-0832833747D9}" type="datetimeFigureOut">
               <a:rPr lang="en-US" smtClean="0"/>
-              <a:t>4/6/15</a:t>
+              <a:t>4/8/15</a:t>
             </a:fld>
             <a:endParaRPr lang="en-US"/>
           </a:p>
@@ -1054,7 +1054,7 @@
           <a:p>
             <a:fld id="{4EB55246-26D4-B843-A31D-0832833747D9}" type="datetimeFigureOut">
               <a:rPr lang="en-US" smtClean="0"/>
-              <a:t>4/6/15</a:t>
+              <a:t>4/8/15</a:t>
             </a:fld>
             <a:endParaRPr lang="en-US"/>
           </a:p>
@@ -1342,7 +1342,7 @@
           <a:p>
             <a:fld id="{4EB55246-26D4-B843-A31D-0832833747D9}" type="datetimeFigureOut">
               <a:rPr lang="en-US" smtClean="0"/>
-              <a:t>4/6/15</a:t>
+              <a:t>4/8/15</a:t>
             </a:fld>
             <a:endParaRPr lang="en-US"/>
           </a:p>
@@ -1764,7 +1764,7 @@
           <a:p>
             <a:fld id="{4EB55246-26D4-B843-A31D-0832833747D9}" type="datetimeFigureOut">
               <a:rPr lang="en-US" smtClean="0"/>
-              <a:t>4/6/15</a:t>
+              <a:t>4/8/15</a:t>
             </a:fld>
             <a:endParaRPr lang="en-US"/>
           </a:p>
@@ -1882,7 +1882,7 @@
           <a:p>
             <a:fld id="{4EB55246-26D4-B843-A31D-0832833747D9}" type="datetimeFigureOut">
               <a:rPr lang="en-US" smtClean="0"/>
-              <a:t>4/6/15</a:t>
+              <a:t>4/8/15</a:t>
             </a:fld>
             <a:endParaRPr lang="en-US"/>
           </a:p>
@@ -1977,7 +1977,7 @@
           <a:p>
             <a:fld id="{4EB55246-26D4-B843-A31D-0832833747D9}" type="datetimeFigureOut">
               <a:rPr lang="en-US" smtClean="0"/>
-              <a:t>4/6/15</a:t>
+              <a:t>4/8/15</a:t>
             </a:fld>
             <a:endParaRPr lang="en-US"/>
           </a:p>
@@ -2254,7 +2254,7 @@
           <a:p>
             <a:fld id="{4EB55246-26D4-B843-A31D-0832833747D9}" type="datetimeFigureOut">
               <a:rPr lang="en-US" smtClean="0"/>
-              <a:t>4/6/15</a:t>
+              <a:t>4/8/15</a:t>
             </a:fld>
             <a:endParaRPr lang="en-US"/>
           </a:p>
@@ -2507,7 +2507,7 @@
           <a:p>
             <a:fld id="{4EB55246-26D4-B843-A31D-0832833747D9}" type="datetimeFigureOut">
               <a:rPr lang="en-US" smtClean="0"/>
-              <a:t>4/6/15</a:t>
+              <a:t>4/8/15</a:t>
             </a:fld>
             <a:endParaRPr lang="en-US"/>
           </a:p>
@@ -2720,7 +2720,7 @@
           <a:p>
             <a:fld id="{4EB55246-26D4-B843-A31D-0832833747D9}" type="datetimeFigureOut">
               <a:rPr lang="en-US" smtClean="0"/>
-              <a:t>4/6/15</a:t>
+              <a:t>4/8/15</a:t>
             </a:fld>
             <a:endParaRPr lang="en-US"/>
           </a:p>
@@ -3188,8 +3188,8 @@
         </p:nvSpPr>
         <p:spPr>
           <a:xfrm>
-            <a:off x="1073945" y="3155936"/>
-            <a:ext cx="2792774" cy="2236639"/>
+            <a:off x="3041606" y="132682"/>
+            <a:ext cx="6102394" cy="4122619"/>
           </a:xfrm>
           <a:prstGeom prst="roundRect">
             <a:avLst/>
@@ -3239,7 +3239,7 @@
         </p:nvSpPr>
         <p:spPr>
           <a:xfrm>
-            <a:off x="7210962" y="690590"/>
+            <a:off x="7210962" y="700067"/>
             <a:ext cx="1875438" cy="1134966"/>
           </a:xfrm>
           <a:prstGeom prst="roundRect">
@@ -3317,7 +3317,7 @@
         </p:nvSpPr>
         <p:spPr>
           <a:xfrm>
-            <a:off x="3069094" y="375449"/>
+            <a:off x="3078572" y="384926"/>
             <a:ext cx="2272548" cy="1908955"/>
           </a:xfrm>
           <a:prstGeom prst="roundRect">
@@ -3432,7 +3432,7 @@
         </p:nvGrpSpPr>
         <p:grpSpPr>
           <a:xfrm>
-            <a:off x="5375546" y="700250"/>
+            <a:off x="5375546" y="709727"/>
             <a:ext cx="1804731" cy="1210024"/>
             <a:chOff x="4990878" y="4217364"/>
             <a:chExt cx="1804731" cy="1210024"/>
@@ -3561,7 +3561,7 @@
         </p:blipFill>
         <p:spPr>
           <a:xfrm>
-            <a:off x="0" y="269769"/>
+            <a:off x="9478" y="279246"/>
             <a:ext cx="1208441" cy="2128835"/>
           </a:xfrm>
           <a:prstGeom prst="rect">
@@ -3577,7 +3577,7 @@
         </p:nvSpPr>
         <p:spPr>
           <a:xfrm>
-            <a:off x="6582306" y="3821361"/>
+            <a:off x="6297963" y="2919004"/>
             <a:ext cx="2134448" cy="1134966"/>
           </a:xfrm>
           <a:prstGeom prst="roundRect">
@@ -3623,8 +3623,13 @@
                   <a:srgbClr val="000000"/>
                 </a:solidFill>
               </a:rPr>
-              <a:t>File </a:t>
-            </a:r>
+              <a:t>Microsoft Azure</a:t>
+            </a:r>
+            <a:endParaRPr lang="en-US" dirty="0" smtClean="0">
+              <a:solidFill>
+                <a:srgbClr val="000000"/>
+              </a:solidFill>
+            </a:endParaRPr>
           </a:p>
           <a:p>
             <a:pPr marL="285750" indent="-169863">
@@ -3637,7 +3642,7 @@
                   <a:srgbClr val="000000"/>
                 </a:solidFill>
               </a:rPr>
-              <a:t>RAM</a:t>
+              <a:t>Amazon S3</a:t>
             </a:r>
             <a:endParaRPr lang="en-US" dirty="0">
               <a:solidFill>
@@ -3655,7 +3660,7 @@
         </p:nvGrpSpPr>
         <p:grpSpPr>
           <a:xfrm>
-            <a:off x="1073945" y="-28038"/>
+            <a:off x="1083423" y="-28038"/>
             <a:ext cx="2198814" cy="1771333"/>
             <a:chOff x="4837426" y="3933054"/>
             <a:chExt cx="2198814" cy="1771333"/>
@@ -3737,7 +3742,6 @@
                 <a:rPr lang="en-US" dirty="0" smtClean="0"/>
                 <a:t>(e.g., Location)</a:t>
               </a:r>
-              <a:endParaRPr lang="en-US" dirty="0" smtClean="0"/>
             </a:p>
           </p:txBody>
         </p:sp>
@@ -3775,7 +3779,6 @@
                 <a:rPr lang="en-US" dirty="0" smtClean="0"/>
                 <a:t>(e.g., GPS location)</a:t>
               </a:r>
-              <a:endParaRPr lang="en-US" dirty="0" smtClean="0"/>
             </a:p>
           </p:txBody>
         </p:sp>
@@ -3788,14 +3791,14 @@
         </p:nvCxnSpPr>
         <p:spPr>
           <a:xfrm>
-            <a:off x="1227397" y="2042019"/>
+            <a:off x="1236875" y="2013588"/>
             <a:ext cx="1804731" cy="0"/>
           </a:xfrm>
           <a:prstGeom prst="straightConnector1">
             <a:avLst/>
           </a:prstGeom>
-          <a:ln w="50800">
-            <a:tailEnd type="arrow"/>
+          <a:ln w="101600">
+            <a:tailEnd type="triangle"/>
           </a:ln>
         </p:spPr>
         <p:style>
@@ -3821,8 +3824,8 @@
         </p:nvSpPr>
         <p:spPr>
           <a:xfrm>
-            <a:off x="1137375" y="2023072"/>
-            <a:ext cx="1829460" cy="646331"/>
+            <a:off x="965962" y="2051503"/>
+            <a:ext cx="2001682" cy="646331"/>
           </a:xfrm>
           <a:prstGeom prst="rect">
             <a:avLst/>
@@ -3838,14 +3841,125 @@
             <a:pPr algn="ctr"/>
             <a:r>
               <a:rPr lang="en-US" dirty="0" smtClean="0"/>
-              <a:t>Listening probe</a:t>
-            </a:r>
+              <a:t>Listening </a:t>
+            </a:r>
+            <a:r>
+              <a:rPr lang="en-US" dirty="0" smtClean="0"/>
+              <a:t>event</a:t>
+            </a:r>
+            <a:endParaRPr lang="en-US" dirty="0" smtClean="0"/>
           </a:p>
           <a:p>
             <a:pPr algn="ctr"/>
             <a:r>
               <a:rPr lang="en-US" dirty="0" smtClean="0"/>
-              <a:t>(e.g., Phone calls)</a:t>
+              <a:t>(e.g., </a:t>
+            </a:r>
+            <a:r>
+              <a:rPr lang="en-US" dirty="0" smtClean="0"/>
+              <a:t>incoming call)</a:t>
+            </a:r>
+            <a:endParaRPr lang="en-US" dirty="0"/>
+          </a:p>
+        </p:txBody>
+      </p:sp>
+      <p:sp>
+        <p:nvSpPr>
+          <p:cNvPr id="19" name="Curved Right Arrow 18"/>
+          <p:cNvSpPr/>
+          <p:nvPr/>
+        </p:nvSpPr>
+        <p:spPr>
+          <a:xfrm rot="5400000">
+            <a:off x="7035336" y="2044798"/>
+            <a:ext cx="974013" cy="622761"/>
+          </a:xfrm>
+          <a:prstGeom prst="curvedRightArrow">
+            <a:avLst/>
+          </a:prstGeom>
+        </p:spPr>
+        <p:style>
+          <a:lnRef idx="1">
+            <a:schemeClr val="accent1"/>
+          </a:lnRef>
+          <a:fillRef idx="3">
+            <a:schemeClr val="accent1"/>
+          </a:fillRef>
+          <a:effectRef idx="2">
+            <a:schemeClr val="accent1"/>
+          </a:effectRef>
+          <a:fontRef idx="minor">
+            <a:schemeClr val="lt1"/>
+          </a:fontRef>
+        </p:style>
+        <p:txBody>
+          <a:bodyPr lIns="91440" tIns="45720" rIns="91440" bIns="45720" rtlCol="0" anchor="ctr"/>
+          <a:lstStyle/>
+          <a:p>
+            <a:pPr algn="ctr"/>
+            <a:endParaRPr lang="en-US" dirty="0">
+              <a:solidFill>
+                <a:schemeClr val="tx1"/>
+              </a:solidFill>
+            </a:endParaRPr>
+          </a:p>
+        </p:txBody>
+      </p:sp>
+      <p:sp>
+        <p:nvSpPr>
+          <p:cNvPr id="6" name="TextBox 5"/>
+          <p:cNvSpPr txBox="1"/>
+          <p:nvPr/>
+        </p:nvSpPr>
+        <p:spPr>
+          <a:xfrm>
+            <a:off x="7840100" y="2293881"/>
+            <a:ext cx="1402948" cy="369332"/>
+          </a:xfrm>
+          <a:prstGeom prst="rect">
+            <a:avLst/>
+          </a:prstGeom>
+          <a:noFill/>
+        </p:spPr>
+        <p:txBody>
+          <a:bodyPr wrap="none" rtlCol="0">
+            <a:spAutoFit/>
+          </a:bodyPr>
+          <a:lstStyle/>
+          <a:p>
+            <a:r>
+              <a:rPr lang="en-US" dirty="0" smtClean="0"/>
+              <a:t>Data request</a:t>
+            </a:r>
+            <a:endParaRPr lang="en-US" dirty="0"/>
+          </a:p>
+        </p:txBody>
+      </p:sp>
+      <p:sp>
+        <p:nvSpPr>
+          <p:cNvPr id="23" name="TextBox 22"/>
+          <p:cNvSpPr txBox="1"/>
+          <p:nvPr/>
+        </p:nvSpPr>
+        <p:spPr>
+          <a:xfrm>
+            <a:off x="6074450" y="2223415"/>
+            <a:ext cx="1136512" cy="369332"/>
+          </a:xfrm>
+          <a:prstGeom prst="rect">
+            <a:avLst/>
+          </a:prstGeom>
+          <a:noFill/>
+        </p:spPr>
+        <p:txBody>
+          <a:bodyPr wrap="none" rtlCol="0">
+            <a:spAutoFit/>
+          </a:bodyPr>
+          <a:lstStyle/>
+          <a:p>
+            <a:r>
+              <a:rPr lang="en-US" dirty="0" smtClean="0"/>
+              <a:t>Local data</a:t>
             </a:r>
             <a:endParaRPr lang="en-US" dirty="0"/>
           </a:p>

</xml_diff>

<commit_message>
Finished initial architecture graphic.
</commit_message>
<xml_diff>
--- a/Architecture.pptx
+++ b/Architecture.pptx
@@ -288,7 +288,7 @@
           <a:p>
             <a:fld id="{4EB55246-26D4-B843-A31D-0832833747D9}" type="datetimeFigureOut">
               <a:rPr lang="en-US" smtClean="0"/>
-              <a:t>4/8/15</a:t>
+              <a:t>4/17/15</a:t>
             </a:fld>
             <a:endParaRPr lang="en-US"/>
           </a:p>
@@ -458,7 +458,7 @@
           <a:p>
             <a:fld id="{4EB55246-26D4-B843-A31D-0832833747D9}" type="datetimeFigureOut">
               <a:rPr lang="en-US" smtClean="0"/>
-              <a:t>4/8/15</a:t>
+              <a:t>4/17/15</a:t>
             </a:fld>
             <a:endParaRPr lang="en-US"/>
           </a:p>
@@ -638,7 +638,7 @@
           <a:p>
             <a:fld id="{4EB55246-26D4-B843-A31D-0832833747D9}" type="datetimeFigureOut">
               <a:rPr lang="en-US" smtClean="0"/>
-              <a:t>4/8/15</a:t>
+              <a:t>4/17/15</a:t>
             </a:fld>
             <a:endParaRPr lang="en-US"/>
           </a:p>
@@ -808,7 +808,7 @@
           <a:p>
             <a:fld id="{4EB55246-26D4-B843-A31D-0832833747D9}" type="datetimeFigureOut">
               <a:rPr lang="en-US" smtClean="0"/>
-              <a:t>4/8/15</a:t>
+              <a:t>4/17/15</a:t>
             </a:fld>
             <a:endParaRPr lang="en-US"/>
           </a:p>
@@ -1054,7 +1054,7 @@
           <a:p>
             <a:fld id="{4EB55246-26D4-B843-A31D-0832833747D9}" type="datetimeFigureOut">
               <a:rPr lang="en-US" smtClean="0"/>
-              <a:t>4/8/15</a:t>
+              <a:t>4/17/15</a:t>
             </a:fld>
             <a:endParaRPr lang="en-US"/>
           </a:p>
@@ -1342,7 +1342,7 @@
           <a:p>
             <a:fld id="{4EB55246-26D4-B843-A31D-0832833747D9}" type="datetimeFigureOut">
               <a:rPr lang="en-US" smtClean="0"/>
-              <a:t>4/8/15</a:t>
+              <a:t>4/17/15</a:t>
             </a:fld>
             <a:endParaRPr lang="en-US"/>
           </a:p>
@@ -1764,7 +1764,7 @@
           <a:p>
             <a:fld id="{4EB55246-26D4-B843-A31D-0832833747D9}" type="datetimeFigureOut">
               <a:rPr lang="en-US" smtClean="0"/>
-              <a:t>4/8/15</a:t>
+              <a:t>4/17/15</a:t>
             </a:fld>
             <a:endParaRPr lang="en-US"/>
           </a:p>
@@ -1882,7 +1882,7 @@
           <a:p>
             <a:fld id="{4EB55246-26D4-B843-A31D-0832833747D9}" type="datetimeFigureOut">
               <a:rPr lang="en-US" smtClean="0"/>
-              <a:t>4/8/15</a:t>
+              <a:t>4/17/15</a:t>
             </a:fld>
             <a:endParaRPr lang="en-US"/>
           </a:p>
@@ -1977,7 +1977,7 @@
           <a:p>
             <a:fld id="{4EB55246-26D4-B843-A31D-0832833747D9}" type="datetimeFigureOut">
               <a:rPr lang="en-US" smtClean="0"/>
-              <a:t>4/8/15</a:t>
+              <a:t>4/17/15</a:t>
             </a:fld>
             <a:endParaRPr lang="en-US"/>
           </a:p>
@@ -2254,7 +2254,7 @@
           <a:p>
             <a:fld id="{4EB55246-26D4-B843-A31D-0832833747D9}" type="datetimeFigureOut">
               <a:rPr lang="en-US" smtClean="0"/>
-              <a:t>4/8/15</a:t>
+              <a:t>4/17/15</a:t>
             </a:fld>
             <a:endParaRPr lang="en-US"/>
           </a:p>
@@ -2507,7 +2507,7 @@
           <a:p>
             <a:fld id="{4EB55246-26D4-B843-A31D-0832833747D9}" type="datetimeFigureOut">
               <a:rPr lang="en-US" smtClean="0"/>
-              <a:t>4/8/15</a:t>
+              <a:t>4/17/15</a:t>
             </a:fld>
             <a:endParaRPr lang="en-US"/>
           </a:p>
@@ -2720,7 +2720,7 @@
           <a:p>
             <a:fld id="{4EB55246-26D4-B843-A31D-0832833747D9}" type="datetimeFigureOut">
               <a:rPr lang="en-US" smtClean="0"/>
-              <a:t>4/8/15</a:t>
+              <a:t>4/17/15</a:t>
             </a:fld>
             <a:endParaRPr lang="en-US"/>
           </a:p>
@@ -3081,6 +3081,17 @@
 <file path=ppt/slides/slide1.xml><?xml version="1.0" encoding="utf-8"?>
 <p:sld xmlns:a="http://schemas.openxmlformats.org/drawingml/2006/main" xmlns:r="http://schemas.openxmlformats.org/officeDocument/2006/relationships" xmlns:p="http://schemas.openxmlformats.org/presentationml/2006/main">
   <p:cSld>
+    <p:bg>
+      <p:bgPr>
+        <a:solidFill>
+          <a:schemeClr val="accent3">
+            <a:lumMod val="40000"/>
+            <a:lumOff val="60000"/>
+          </a:schemeClr>
+        </a:solidFill>
+        <a:effectLst/>
+      </p:bgPr>
+    </p:bg>
     <p:spTree>
       <p:nvGrpSpPr>
         <p:cNvPr id="1" name=""/>
@@ -3103,8 +3114,8 @@
         </p:nvSpPr>
         <p:spPr>
           <a:xfrm>
-            <a:off x="5718430" y="5174138"/>
-            <a:ext cx="3073068" cy="1378459"/>
+            <a:off x="6046647" y="4765040"/>
+            <a:ext cx="3073068" cy="1889365"/>
           </a:xfrm>
           <a:prstGeom prst="cloud">
             <a:avLst/>
@@ -3138,7 +3149,7 @@
           <a:p>
             <a:pPr algn="ctr"/>
             <a:r>
-              <a:rPr lang="en-US" dirty="0" smtClean="0">
+              <a:rPr lang="en-US" u="sng" dirty="0" smtClean="0">
                 <a:solidFill>
                   <a:srgbClr val="000000"/>
                 </a:solidFill>
@@ -3188,13 +3199,21 @@
         </p:nvSpPr>
         <p:spPr>
           <a:xfrm>
-            <a:off x="3041606" y="132682"/>
-            <a:ext cx="6102394" cy="4122619"/>
+            <a:off x="2785696" y="0"/>
+            <a:ext cx="6358303" cy="4256105"/>
           </a:xfrm>
           <a:prstGeom prst="roundRect">
             <a:avLst/>
           </a:prstGeom>
-          <a:ln/>
+          <a:solidFill>
+            <a:schemeClr val="accent2">
+              <a:lumMod val="60000"/>
+              <a:lumOff val="40000"/>
+            </a:schemeClr>
+          </a:solidFill>
+          <a:ln>
+            <a:noFill/>
+          </a:ln>
         </p:spPr>
         <p:style>
           <a:lnRef idx="1">
@@ -3216,14 +3235,14 @@
           <a:p>
             <a:pPr algn="ctr"/>
             <a:r>
-              <a:rPr lang="en-US" dirty="0" smtClean="0">
+              <a:rPr lang="en-US" u="sng" dirty="0" smtClean="0">
                 <a:solidFill>
                   <a:srgbClr val="000000"/>
                 </a:solidFill>
               </a:rPr>
               <a:t>Protocol</a:t>
             </a:r>
-            <a:endParaRPr lang="en-US" dirty="0">
+            <a:endParaRPr lang="en-US" u="sng" dirty="0">
               <a:solidFill>
                 <a:srgbClr val="000000"/>
               </a:solidFill>
@@ -3239,7 +3258,7 @@
         </p:nvSpPr>
         <p:spPr>
           <a:xfrm>
-            <a:off x="7210962" y="700067"/>
+            <a:off x="7055858" y="700067"/>
             <a:ext cx="1875438" cy="1134966"/>
           </a:xfrm>
           <a:prstGeom prst="roundRect">
@@ -3266,7 +3285,7 @@
           <a:p>
             <a:pPr algn="ctr"/>
             <a:r>
-              <a:rPr lang="en-US" dirty="0" smtClean="0">
+              <a:rPr lang="en-US" u="sng" dirty="0" smtClean="0">
                 <a:solidFill>
                   <a:srgbClr val="000000"/>
                 </a:solidFill>
@@ -3344,13 +3363,18 @@
           <a:p>
             <a:pPr algn="ctr"/>
             <a:r>
-              <a:rPr lang="en-US" dirty="0" smtClean="0">
+              <a:rPr lang="en-US" u="sng" dirty="0" smtClean="0">
                 <a:solidFill>
                   <a:srgbClr val="000000"/>
                 </a:solidFill>
               </a:rPr>
               <a:t>Probes</a:t>
             </a:r>
+            <a:endParaRPr lang="en-US" u="sng" dirty="0" smtClean="0">
+              <a:solidFill>
+                <a:srgbClr val="000000"/>
+              </a:solidFill>
+            </a:endParaRPr>
           </a:p>
           <a:p>
             <a:pPr marL="285750" indent="-169863">
@@ -3432,9 +3456,9 @@
         </p:nvGrpSpPr>
         <p:grpSpPr>
           <a:xfrm>
-            <a:off x="5375546" y="709727"/>
-            <a:ext cx="1804731" cy="1210024"/>
-            <a:chOff x="4990878" y="4217364"/>
+            <a:off x="5414324" y="709727"/>
+            <a:ext cx="1579862" cy="1210024"/>
+            <a:chOff x="5035174" y="4217364"/>
             <a:chExt cx="1804731" cy="1210024"/>
           </a:xfrm>
         </p:grpSpPr>
@@ -3446,7 +3470,7 @@
           </p:nvSpPr>
           <p:spPr>
             <a:xfrm>
-              <a:off x="4990878" y="4550069"/>
+              <a:off x="5035174" y="4550069"/>
               <a:ext cx="1804731" cy="622761"/>
             </a:xfrm>
             <a:prstGeom prst="curvedRightArrow">
@@ -3577,7 +3601,7 @@
         </p:nvSpPr>
         <p:spPr>
           <a:xfrm>
-            <a:off x="6297963" y="2919004"/>
+            <a:off x="6525435" y="2890573"/>
             <a:ext cx="2134448" cy="1134966"/>
           </a:xfrm>
           <a:prstGeom prst="roundRect">
@@ -3604,7 +3628,7 @@
           <a:p>
             <a:pPr algn="ctr"/>
             <a:r>
-              <a:rPr lang="en-US" dirty="0" smtClean="0">
+              <a:rPr lang="en-US" u="sng" dirty="0" smtClean="0">
                 <a:solidFill>
                   <a:srgbClr val="000000"/>
                 </a:solidFill>
@@ -3625,11 +3649,6 @@
               </a:rPr>
               <a:t>Microsoft Azure</a:t>
             </a:r>
-            <a:endParaRPr lang="en-US" dirty="0" smtClean="0">
-              <a:solidFill>
-                <a:srgbClr val="000000"/>
-              </a:solidFill>
-            </a:endParaRPr>
           </a:p>
           <a:p>
             <a:pPr marL="285750" indent="-169863">
@@ -3841,23 +3860,14 @@
             <a:pPr algn="ctr"/>
             <a:r>
               <a:rPr lang="en-US" dirty="0" smtClean="0"/>
-              <a:t>Listening </a:t>
-            </a:r>
+              <a:t>Listening event</a:t>
+            </a:r>
+          </a:p>
+          <a:p>
+            <a:pPr algn="ctr"/>
             <a:r>
               <a:rPr lang="en-US" dirty="0" smtClean="0"/>
-              <a:t>event</a:t>
-            </a:r>
-            <a:endParaRPr lang="en-US" dirty="0" smtClean="0"/>
-          </a:p>
-          <a:p>
-            <a:pPr algn="ctr"/>
-            <a:r>
-              <a:rPr lang="en-US" dirty="0" smtClean="0"/>
-              <a:t>(e.g., </a:t>
-            </a:r>
-            <a:r>
-              <a:rPr lang="en-US" dirty="0" smtClean="0"/>
-              <a:t>incoming call)</a:t>
+              <a:t>(e.g., incoming call)</a:t>
             </a:r>
             <a:endParaRPr lang="en-US" dirty="0"/>
           </a:p>
@@ -3913,7 +3923,7 @@
         </p:nvSpPr>
         <p:spPr>
           <a:xfrm>
-            <a:off x="7840100" y="2293881"/>
+            <a:off x="7840100" y="2199111"/>
             <a:ext cx="1402948" cy="369332"/>
           </a:xfrm>
           <a:prstGeom prst="rect">
@@ -3943,7 +3953,7 @@
         </p:nvSpPr>
         <p:spPr>
           <a:xfrm>
-            <a:off x="6074450" y="2223415"/>
+            <a:off x="6188187" y="2199111"/>
             <a:ext cx="1136512" cy="369332"/>
           </a:xfrm>
           <a:prstGeom prst="rect">
@@ -3965,6 +3975,232 @@
           </a:p>
         </p:txBody>
       </p:sp>
+      <p:cxnSp>
+        <p:nvCxnSpPr>
+          <p:cNvPr id="24" name="Straight Arrow Connector 23"/>
+          <p:cNvCxnSpPr>
+            <a:stCxn id="11" idx="2"/>
+            <a:endCxn id="10" idx="3"/>
+          </p:cNvCxnSpPr>
+          <p:nvPr/>
+        </p:nvCxnSpPr>
+        <p:spPr>
+          <a:xfrm flipH="1">
+            <a:off x="7583181" y="4025539"/>
+            <a:ext cx="9478" cy="847527"/>
+          </a:xfrm>
+          <a:prstGeom prst="straightConnector1">
+            <a:avLst/>
+          </a:prstGeom>
+          <a:ln w="101600">
+            <a:tailEnd type="triangle"/>
+          </a:ln>
+        </p:spPr>
+        <p:style>
+          <a:lnRef idx="2">
+            <a:schemeClr val="accent1"/>
+          </a:lnRef>
+          <a:fillRef idx="0">
+            <a:schemeClr val="accent1"/>
+          </a:fillRef>
+          <a:effectRef idx="1">
+            <a:schemeClr val="accent1"/>
+          </a:effectRef>
+          <a:fontRef idx="minor">
+            <a:schemeClr val="tx1"/>
+          </a:fontRef>
+        </p:style>
+      </p:cxnSp>
+      <p:sp>
+        <p:nvSpPr>
+          <p:cNvPr id="31" name="Rounded Rectangle 30"/>
+          <p:cNvSpPr/>
+          <p:nvPr/>
+        </p:nvSpPr>
+        <p:spPr>
+          <a:xfrm>
+            <a:off x="3396418" y="4799513"/>
+            <a:ext cx="2134448" cy="1791666"/>
+          </a:xfrm>
+          <a:prstGeom prst="roundRect">
+            <a:avLst/>
+          </a:prstGeom>
+        </p:spPr>
+        <p:style>
+          <a:lnRef idx="1">
+            <a:schemeClr val="accent1"/>
+          </a:lnRef>
+          <a:fillRef idx="3">
+            <a:schemeClr val="accent1"/>
+          </a:fillRef>
+          <a:effectRef idx="2">
+            <a:schemeClr val="accent1"/>
+          </a:effectRef>
+          <a:fontRef idx="minor">
+            <a:schemeClr val="lt1"/>
+          </a:fontRef>
+        </p:style>
+        <p:txBody>
+          <a:bodyPr lIns="91440" tIns="45720" rIns="91440" bIns="45720" rtlCol="0" anchor="ctr"/>
+          <a:lstStyle/>
+          <a:p>
+            <a:pPr algn="ctr"/>
+            <a:r>
+              <a:rPr lang="en-US" u="sng" dirty="0" err="1" smtClean="0">
+                <a:solidFill>
+                  <a:srgbClr val="000000"/>
+                </a:solidFill>
+              </a:rPr>
+              <a:t>SensusR</a:t>
+            </a:r>
+            <a:endParaRPr lang="en-US" u="sng" dirty="0" smtClean="0">
+              <a:solidFill>
+                <a:srgbClr val="000000"/>
+              </a:solidFill>
+            </a:endParaRPr>
+          </a:p>
+          <a:p>
+            <a:pPr marL="285750" indent="-169863">
+              <a:buFont typeface="Arial"/>
+              <a:buChar char="•"/>
+            </a:pPr>
+            <a:r>
+              <a:rPr lang="en-US" dirty="0" smtClean="0">
+                <a:solidFill>
+                  <a:srgbClr val="000000"/>
+                </a:solidFill>
+              </a:rPr>
+              <a:t>Data ingest</a:t>
+            </a:r>
+          </a:p>
+          <a:p>
+            <a:pPr marL="285750" indent="-169863">
+              <a:buFont typeface="Arial"/>
+              <a:buChar char="•"/>
+            </a:pPr>
+            <a:r>
+              <a:rPr lang="en-US" dirty="0" smtClean="0">
+                <a:solidFill>
+                  <a:srgbClr val="000000"/>
+                </a:solidFill>
+              </a:rPr>
+              <a:t>Visualization</a:t>
+            </a:r>
+          </a:p>
+          <a:p>
+            <a:pPr marL="285750" indent="-169863">
+              <a:buFont typeface="Arial"/>
+              <a:buChar char="•"/>
+            </a:pPr>
+            <a:r>
+              <a:rPr lang="en-US" dirty="0" smtClean="0">
+                <a:solidFill>
+                  <a:srgbClr val="000000"/>
+                </a:solidFill>
+              </a:rPr>
+              <a:t>Modeling</a:t>
+            </a:r>
+          </a:p>
+        </p:txBody>
+      </p:sp>
+      <p:cxnSp>
+        <p:nvCxnSpPr>
+          <p:cNvPr id="33" name="Straight Arrow Connector 32"/>
+          <p:cNvCxnSpPr>
+            <a:stCxn id="10" idx="2"/>
+            <a:endCxn id="31" idx="3"/>
+          </p:cNvCxnSpPr>
+          <p:nvPr/>
+        </p:nvCxnSpPr>
+        <p:spPr>
+          <a:xfrm flipH="1" flipV="1">
+            <a:off x="5530866" y="5695346"/>
+            <a:ext cx="525313" cy="14377"/>
+          </a:xfrm>
+          <a:prstGeom prst="straightConnector1">
+            <a:avLst/>
+          </a:prstGeom>
+          <a:ln w="101600">
+            <a:tailEnd type="triangle"/>
+          </a:ln>
+        </p:spPr>
+        <p:style>
+          <a:lnRef idx="2">
+            <a:schemeClr val="accent1"/>
+          </a:lnRef>
+          <a:fillRef idx="0">
+            <a:schemeClr val="accent1"/>
+          </a:fillRef>
+          <a:effectRef idx="1">
+            <a:schemeClr val="accent1"/>
+          </a:effectRef>
+          <a:fontRef idx="minor">
+            <a:schemeClr val="tx1"/>
+          </a:fontRef>
+        </p:style>
+      </p:cxnSp>
+      <p:pic>
+        <p:nvPicPr>
+          <p:cNvPr id="38" name="Picture 37"/>
+          <p:cNvPicPr>
+            <a:picLocks noChangeAspect="1"/>
+          </p:cNvPicPr>
+          <p:nvPr/>
+        </p:nvPicPr>
+        <p:blipFill rotWithShape="1">
+          <a:blip r:embed="rId3"/>
+          <a:srcRect l="-47482" t="2138" r="50690" b="50608"/>
+          <a:stretch/>
+        </p:blipFill>
+        <p:spPr>
+          <a:xfrm>
+            <a:off x="-2532888" y="4764024"/>
+            <a:ext cx="5431536" cy="2020824"/>
+          </a:xfrm>
+          <a:prstGeom prst="rect">
+            <a:avLst/>
+          </a:prstGeom>
+          <a:effectLst>
+            <a:softEdge rad="50800"/>
+          </a:effectLst>
+        </p:spPr>
+      </p:pic>
+      <p:cxnSp>
+        <p:nvCxnSpPr>
+          <p:cNvPr id="45" name="Straight Arrow Connector 44"/>
+          <p:cNvCxnSpPr>
+            <a:stCxn id="31" idx="1"/>
+            <a:endCxn id="38" idx="3"/>
+          </p:cNvCxnSpPr>
+          <p:nvPr/>
+        </p:nvCxnSpPr>
+        <p:spPr>
+          <a:xfrm flipH="1">
+            <a:off x="2898648" y="5695346"/>
+            <a:ext cx="497770" cy="79090"/>
+          </a:xfrm>
+          <a:prstGeom prst="straightConnector1">
+            <a:avLst/>
+          </a:prstGeom>
+          <a:ln w="101600">
+            <a:tailEnd type="triangle"/>
+          </a:ln>
+        </p:spPr>
+        <p:style>
+          <a:lnRef idx="2">
+            <a:schemeClr val="accent1"/>
+          </a:lnRef>
+          <a:fillRef idx="0">
+            <a:schemeClr val="accent1"/>
+          </a:fillRef>
+          <a:effectRef idx="1">
+            <a:schemeClr val="accent1"/>
+          </a:effectRef>
+          <a:fontRef idx="minor">
+            <a:schemeClr val="tx1"/>
+          </a:fontRef>
+        </p:style>
+      </p:cxnSp>
     </p:spTree>
     <p:extLst>
       <p:ext uri="{BB962C8B-B14F-4D97-AF65-F5344CB8AC3E}">

</xml_diff>